<commit_message>
ap analise mercado + verificação ao adicionar doc started
</commit_message>
<xml_diff>
--- a/_apresentações/analise_mercado.pptx
+++ b/_apresentações/analise_mercado.pptx
@@ -207,7 +207,7 @@
           <a:p>
             <a:fld id="{A59CCC90-DD18-45CE-9930-85E2190B6EB3}" type="datetimeFigureOut">
               <a:rPr lang="en-US" smtClean="0"/>
-              <a:t>11/23/2021</a:t>
+              <a:t>11/24/2021</a:t>
             </a:fld>
             <a:endParaRPr lang="en-US"/>
           </a:p>
@@ -1734,7 +1734,7 @@
           <a:p>
             <a:fld id="{7B2BFB5F-8F55-4037-8342-DBA37736C541}" type="datetime1">
               <a:rPr lang="pt-PT" smtClean="0"/>
-              <a:t>23/11/2021</a:t>
+              <a:t>24/11/2021</a:t>
             </a:fld>
             <a:endParaRPr lang="pt-PT"/>
           </a:p>
@@ -1934,7 +1934,7 @@
           <a:p>
             <a:fld id="{E88DAECE-19DC-4716-ACB9-133D8C1710C0}" type="datetime1">
               <a:rPr lang="pt-PT" smtClean="0"/>
-              <a:t>23/11/2021</a:t>
+              <a:t>24/11/2021</a:t>
             </a:fld>
             <a:endParaRPr lang="pt-PT"/>
           </a:p>
@@ -2144,7 +2144,7 @@
           <a:p>
             <a:fld id="{3126B636-9E32-4AEF-8D3D-FD0DB4968D19}" type="datetime1">
               <a:rPr lang="pt-PT" smtClean="0"/>
-              <a:t>23/11/2021</a:t>
+              <a:t>24/11/2021</a:t>
             </a:fld>
             <a:endParaRPr lang="pt-PT"/>
           </a:p>
@@ -2344,7 +2344,7 @@
           <a:p>
             <a:fld id="{75607C13-EF84-4BAF-858E-455D02510A9F}" type="datetime1">
               <a:rPr lang="pt-PT" smtClean="0"/>
-              <a:t>23/11/2021</a:t>
+              <a:t>24/11/2021</a:t>
             </a:fld>
             <a:endParaRPr lang="pt-PT"/>
           </a:p>
@@ -2620,7 +2620,7 @@
           <a:p>
             <a:fld id="{64BB17DF-5174-484A-B8E1-9D6AC6AFE7FD}" type="datetime1">
               <a:rPr lang="pt-PT" smtClean="0"/>
-              <a:t>23/11/2021</a:t>
+              <a:t>24/11/2021</a:t>
             </a:fld>
             <a:endParaRPr lang="pt-PT"/>
           </a:p>
@@ -2888,7 +2888,7 @@
           <a:p>
             <a:fld id="{A3C6A7FE-3508-4D9A-AB3E-37A53B7E80D8}" type="datetime1">
               <a:rPr lang="pt-PT" smtClean="0"/>
-              <a:t>23/11/2021</a:t>
+              <a:t>24/11/2021</a:t>
             </a:fld>
             <a:endParaRPr lang="pt-PT"/>
           </a:p>
@@ -3303,7 +3303,7 @@
           <a:p>
             <a:fld id="{DBC3BE71-E2F4-452C-BC14-F604DBAB02CB}" type="datetime1">
               <a:rPr lang="pt-PT" smtClean="0"/>
-              <a:t>23/11/2021</a:t>
+              <a:t>24/11/2021</a:t>
             </a:fld>
             <a:endParaRPr lang="pt-PT"/>
           </a:p>
@@ -3445,7 +3445,7 @@
           <a:p>
             <a:fld id="{16EE7CF8-E2C9-4EDF-91BD-12C54B596268}" type="datetime1">
               <a:rPr lang="pt-PT" smtClean="0"/>
-              <a:t>23/11/2021</a:t>
+              <a:t>24/11/2021</a:t>
             </a:fld>
             <a:endParaRPr lang="pt-PT"/>
           </a:p>
@@ -3558,7 +3558,7 @@
           <a:p>
             <a:fld id="{EB86D543-6D53-48E0-9647-8C8473FC00EB}" type="datetime1">
               <a:rPr lang="pt-PT" smtClean="0"/>
-              <a:t>23/11/2021</a:t>
+              <a:t>24/11/2021</a:t>
             </a:fld>
             <a:endParaRPr lang="pt-PT"/>
           </a:p>
@@ -3871,7 +3871,7 @@
           <a:p>
             <a:fld id="{6F927EA4-49A0-48A7-8D38-A660BF8D0961}" type="datetime1">
               <a:rPr lang="pt-PT" smtClean="0"/>
-              <a:t>23/11/2021</a:t>
+              <a:t>24/11/2021</a:t>
             </a:fld>
             <a:endParaRPr lang="pt-PT"/>
           </a:p>
@@ -4160,7 +4160,7 @@
           <a:p>
             <a:fld id="{72897C4C-3520-41E5-9678-9D542B992DBE}" type="datetime1">
               <a:rPr lang="pt-PT" smtClean="0"/>
-              <a:t>23/11/2021</a:t>
+              <a:t>24/11/2021</a:t>
             </a:fld>
             <a:endParaRPr lang="pt-PT"/>
           </a:p>
@@ -4403,7 +4403,7 @@
           <a:p>
             <a:fld id="{33E924EB-683F-4E34-A5D7-D4EBDFBAB650}" type="datetime1">
               <a:rPr lang="pt-PT" smtClean="0"/>
-              <a:t>23/11/2021</a:t>
+              <a:t>24/11/2021</a:t>
             </a:fld>
             <a:endParaRPr lang="pt-PT"/>
           </a:p>
@@ -11705,8 +11705,8 @@
         </p:nvSpPr>
         <p:spPr>
           <a:xfrm>
-            <a:off x="872292" y="2336986"/>
-            <a:ext cx="3213934" cy="2101664"/>
+            <a:off x="558209" y="2336986"/>
+            <a:ext cx="3528017" cy="2101664"/>
           </a:xfrm>
         </p:spPr>
         <p:txBody>
@@ -11832,7 +11832,7 @@
         </p:nvSpPr>
         <p:spPr>
           <a:xfrm>
-            <a:off x="4267200" y="2340068"/>
+            <a:off x="4371975" y="2379709"/>
             <a:ext cx="3448049" cy="2098582"/>
           </a:xfrm>
           <a:prstGeom prst="rect">
@@ -12052,8 +12052,8 @@
         </p:nvSpPr>
         <p:spPr>
           <a:xfrm>
-            <a:off x="8220075" y="2336986"/>
-            <a:ext cx="3272149" cy="2101664"/>
+            <a:off x="8276021" y="2336986"/>
+            <a:ext cx="3446585" cy="2101664"/>
           </a:xfrm>
           <a:prstGeom prst="rect">
             <a:avLst/>
@@ -12286,7 +12286,7 @@
         <p:spPr>
           <a:xfrm>
             <a:off x="4114801" y="2221992"/>
-            <a:ext cx="0" cy="2216658"/>
+            <a:ext cx="0" cy="4134358"/>
           </a:xfrm>
           <a:prstGeom prst="line">
             <a:avLst/>
@@ -12307,12 +12307,153 @@
           </a:fontRef>
         </p:style>
       </p:cxnSp>
+      <p:pic>
+        <p:nvPicPr>
+          <p:cNvPr id="1028" name="Picture 4" descr="Contract - Free business icons">
+            <a:extLst>
+              <a:ext uri="{FF2B5EF4-FFF2-40B4-BE49-F238E27FC236}">
+                <a16:creationId xmlns:a16="http://schemas.microsoft.com/office/drawing/2014/main" id="{6E10ED28-0A78-4FEE-B5B1-3FE61D6E6EE3}"/>
+              </a:ext>
+            </a:extLst>
+          </p:cNvPr>
+          <p:cNvPicPr>
+            <a:picLocks noChangeAspect="1" noChangeArrowheads="1"/>
+          </p:cNvPicPr>
+          <p:nvPr/>
+        </p:nvPicPr>
+        <p:blipFill>
+          <a:blip r:embed="rId3">
+            <a:extLst>
+              <a:ext uri="{28A0092B-C50C-407E-A947-70E740481C1C}">
+                <a14:useLocalDpi xmlns:a14="http://schemas.microsoft.com/office/drawing/2010/main" val="0"/>
+              </a:ext>
+            </a:extLst>
+          </a:blip>
+          <a:srcRect/>
+          <a:stretch>
+            <a:fillRect/>
+          </a:stretch>
+        </p:blipFill>
+        <p:spPr bwMode="auto">
+          <a:xfrm>
+            <a:off x="9265599" y="4640920"/>
+            <a:ext cx="1600200" cy="1600200"/>
+          </a:xfrm>
+          <a:prstGeom prst="rect">
+            <a:avLst/>
+          </a:prstGeom>
+          <a:noFill/>
+          <a:extLst>
+            <a:ext uri="{909E8E84-426E-40DD-AFC4-6F175D3DCCD1}">
+              <a14:hiddenFill xmlns:a14="http://schemas.microsoft.com/office/drawing/2010/main">
+                <a:solidFill>
+                  <a:srgbClr val="FFFFFF"/>
+                </a:solidFill>
+              </a14:hiddenFill>
+            </a:ext>
+          </a:extLst>
+        </p:spPr>
+      </p:pic>
+      <p:pic>
+        <p:nvPicPr>
+          <p:cNvPr id="1030" name="Picture 6" descr="Etiqueta de preço - ícones de comércio e compras grátis">
+            <a:extLst>
+              <a:ext uri="{FF2B5EF4-FFF2-40B4-BE49-F238E27FC236}">
+                <a16:creationId xmlns:a16="http://schemas.microsoft.com/office/drawing/2014/main" id="{5A50215C-3180-44CB-B6D1-934C311DDC8B}"/>
+              </a:ext>
+            </a:extLst>
+          </p:cNvPr>
+          <p:cNvPicPr>
+            <a:picLocks noChangeAspect="1" noChangeArrowheads="1"/>
+          </p:cNvPicPr>
+          <p:nvPr/>
+        </p:nvPicPr>
+        <p:blipFill>
+          <a:blip r:embed="rId4">
+            <a:extLst>
+              <a:ext uri="{28A0092B-C50C-407E-A947-70E740481C1C}">
+                <a14:useLocalDpi xmlns:a14="http://schemas.microsoft.com/office/drawing/2010/main" val="0"/>
+              </a:ext>
+            </a:extLst>
+          </a:blip>
+          <a:srcRect/>
+          <a:stretch>
+            <a:fillRect/>
+          </a:stretch>
+        </p:blipFill>
+        <p:spPr bwMode="auto">
+          <a:xfrm>
+            <a:off x="5156252" y="4613148"/>
+            <a:ext cx="1600200" cy="1600200"/>
+          </a:xfrm>
+          <a:prstGeom prst="rect">
+            <a:avLst/>
+          </a:prstGeom>
+          <a:noFill/>
+          <a:extLst>
+            <a:ext uri="{909E8E84-426E-40DD-AFC4-6F175D3DCCD1}">
+              <a14:hiddenFill xmlns:a14="http://schemas.microsoft.com/office/drawing/2010/main">
+                <a:solidFill>
+                  <a:srgbClr val="FFFFFF"/>
+                </a:solidFill>
+              </a14:hiddenFill>
+            </a:ext>
+          </a:extLst>
+        </p:spPr>
+      </p:pic>
+      <p:pic>
+        <p:nvPicPr>
+          <p:cNvPr id="1034" name="Picture 10" descr="Perfil - ícones de rede grátis">
+            <a:extLst>
+              <a:ext uri="{FF2B5EF4-FFF2-40B4-BE49-F238E27FC236}">
+                <a16:creationId xmlns:a16="http://schemas.microsoft.com/office/drawing/2014/main" id="{00FE48B5-E2BB-4D10-85FA-B9FDBBFACE03}"/>
+              </a:ext>
+            </a:extLst>
+          </p:cNvPr>
+          <p:cNvPicPr>
+            <a:picLocks noChangeAspect="1" noChangeArrowheads="1"/>
+          </p:cNvPicPr>
+          <p:nvPr/>
+        </p:nvPicPr>
+        <p:blipFill>
+          <a:blip r:embed="rId5">
+            <a:extLst>
+              <a:ext uri="{28A0092B-C50C-407E-A947-70E740481C1C}">
+                <a14:useLocalDpi xmlns:a14="http://schemas.microsoft.com/office/drawing/2010/main" val="0"/>
+              </a:ext>
+            </a:extLst>
+          </a:blip>
+          <a:srcRect/>
+          <a:stretch>
+            <a:fillRect/>
+          </a:stretch>
+        </p:blipFill>
+        <p:spPr bwMode="auto">
+          <a:xfrm>
+            <a:off x="1497651" y="4559293"/>
+            <a:ext cx="1546518" cy="1600200"/>
+          </a:xfrm>
+          <a:prstGeom prst="rect">
+            <a:avLst/>
+          </a:prstGeom>
+          <a:noFill/>
+          <a:extLst>
+            <a:ext uri="{909E8E84-426E-40DD-AFC4-6F175D3DCCD1}">
+              <a14:hiddenFill xmlns:a14="http://schemas.microsoft.com/office/drawing/2010/main">
+                <a:solidFill>
+                  <a:srgbClr val="FFFFFF"/>
+                </a:solidFill>
+              </a14:hiddenFill>
+            </a:ext>
+          </a:extLst>
+        </p:spPr>
+      </p:pic>
       <p:cxnSp>
         <p:nvCxnSpPr>
-          <p:cNvPr id="16" name="Conexão reta 15">
-            <a:extLst>
-              <a:ext uri="{FF2B5EF4-FFF2-40B4-BE49-F238E27FC236}">
-                <a16:creationId xmlns:a16="http://schemas.microsoft.com/office/drawing/2014/main" id="{E3C9225A-E1E4-47C3-89A0-59698CFD15C7}"/>
+          <p:cNvPr id="22" name="Conexão reta 21">
+            <a:extLst>
+              <a:ext uri="{FF2B5EF4-FFF2-40B4-BE49-F238E27FC236}">
+                <a16:creationId xmlns:a16="http://schemas.microsoft.com/office/drawing/2014/main" id="{F7DD76C7-C5DC-486B-AB4E-CA175C366DE8}"/>
               </a:ext>
             </a:extLst>
           </p:cNvPr>
@@ -12323,8 +12464,8 @@
         </p:nvCxnSpPr>
         <p:spPr>
           <a:xfrm>
-            <a:off x="7886700" y="2221992"/>
-            <a:ext cx="0" cy="2216658"/>
+            <a:off x="8010526" y="2221992"/>
+            <a:ext cx="0" cy="4134358"/>
           </a:xfrm>
           <a:prstGeom prst="line">
             <a:avLst/>

</xml_diff>

<commit_message>
add categoria operacional, com verficação + promenores + ppt analise mercado atualizado
</commit_message>
<xml_diff>
--- a/_apresentações/analise_mercado.pptx
+++ b/_apresentações/analise_mercado.pptx
@@ -207,7 +207,7 @@
           <a:p>
             <a:fld id="{A59CCC90-DD18-45CE-9930-85E2190B6EB3}" type="datetimeFigureOut">
               <a:rPr lang="en-US" smtClean="0"/>
-              <a:t>11/24/2021</a:t>
+              <a:t>11/25/2021</a:t>
             </a:fld>
             <a:endParaRPr lang="en-US"/>
           </a:p>
@@ -1734,7 +1734,7 @@
           <a:p>
             <a:fld id="{7B2BFB5F-8F55-4037-8342-DBA37736C541}" type="datetime1">
               <a:rPr lang="pt-PT" smtClean="0"/>
-              <a:t>24/11/2021</a:t>
+              <a:t>25/11/2021</a:t>
             </a:fld>
             <a:endParaRPr lang="pt-PT"/>
           </a:p>
@@ -1934,7 +1934,7 @@
           <a:p>
             <a:fld id="{E88DAECE-19DC-4716-ACB9-133D8C1710C0}" type="datetime1">
               <a:rPr lang="pt-PT" smtClean="0"/>
-              <a:t>24/11/2021</a:t>
+              <a:t>25/11/2021</a:t>
             </a:fld>
             <a:endParaRPr lang="pt-PT"/>
           </a:p>
@@ -2144,7 +2144,7 @@
           <a:p>
             <a:fld id="{3126B636-9E32-4AEF-8D3D-FD0DB4968D19}" type="datetime1">
               <a:rPr lang="pt-PT" smtClean="0"/>
-              <a:t>24/11/2021</a:t>
+              <a:t>25/11/2021</a:t>
             </a:fld>
             <a:endParaRPr lang="pt-PT"/>
           </a:p>
@@ -2344,7 +2344,7 @@
           <a:p>
             <a:fld id="{75607C13-EF84-4BAF-858E-455D02510A9F}" type="datetime1">
               <a:rPr lang="pt-PT" smtClean="0"/>
-              <a:t>24/11/2021</a:t>
+              <a:t>25/11/2021</a:t>
             </a:fld>
             <a:endParaRPr lang="pt-PT"/>
           </a:p>
@@ -2620,7 +2620,7 @@
           <a:p>
             <a:fld id="{64BB17DF-5174-484A-B8E1-9D6AC6AFE7FD}" type="datetime1">
               <a:rPr lang="pt-PT" smtClean="0"/>
-              <a:t>24/11/2021</a:t>
+              <a:t>25/11/2021</a:t>
             </a:fld>
             <a:endParaRPr lang="pt-PT"/>
           </a:p>
@@ -2888,7 +2888,7 @@
           <a:p>
             <a:fld id="{A3C6A7FE-3508-4D9A-AB3E-37A53B7E80D8}" type="datetime1">
               <a:rPr lang="pt-PT" smtClean="0"/>
-              <a:t>24/11/2021</a:t>
+              <a:t>25/11/2021</a:t>
             </a:fld>
             <a:endParaRPr lang="pt-PT"/>
           </a:p>
@@ -3303,7 +3303,7 @@
           <a:p>
             <a:fld id="{DBC3BE71-E2F4-452C-BC14-F604DBAB02CB}" type="datetime1">
               <a:rPr lang="pt-PT" smtClean="0"/>
-              <a:t>24/11/2021</a:t>
+              <a:t>25/11/2021</a:t>
             </a:fld>
             <a:endParaRPr lang="pt-PT"/>
           </a:p>
@@ -3445,7 +3445,7 @@
           <a:p>
             <a:fld id="{16EE7CF8-E2C9-4EDF-91BD-12C54B596268}" type="datetime1">
               <a:rPr lang="pt-PT" smtClean="0"/>
-              <a:t>24/11/2021</a:t>
+              <a:t>25/11/2021</a:t>
             </a:fld>
             <a:endParaRPr lang="pt-PT"/>
           </a:p>
@@ -3558,7 +3558,7 @@
           <a:p>
             <a:fld id="{EB86D543-6D53-48E0-9647-8C8473FC00EB}" type="datetime1">
               <a:rPr lang="pt-PT" smtClean="0"/>
-              <a:t>24/11/2021</a:t>
+              <a:t>25/11/2021</a:t>
             </a:fld>
             <a:endParaRPr lang="pt-PT"/>
           </a:p>
@@ -3871,7 +3871,7 @@
           <a:p>
             <a:fld id="{6F927EA4-49A0-48A7-8D38-A660BF8D0961}" type="datetime1">
               <a:rPr lang="pt-PT" smtClean="0"/>
-              <a:t>24/11/2021</a:t>
+              <a:t>25/11/2021</a:t>
             </a:fld>
             <a:endParaRPr lang="pt-PT"/>
           </a:p>
@@ -4160,7 +4160,7 @@
           <a:p>
             <a:fld id="{72897C4C-3520-41E5-9678-9D542B992DBE}" type="datetime1">
               <a:rPr lang="pt-PT" smtClean="0"/>
-              <a:t>24/11/2021</a:t>
+              <a:t>25/11/2021</a:t>
             </a:fld>
             <a:endParaRPr lang="pt-PT"/>
           </a:p>
@@ -4403,7 +4403,7 @@
           <a:p>
             <a:fld id="{33E924EB-683F-4E34-A5D7-D4EBDFBAB650}" type="datetime1">
               <a:rPr lang="pt-PT" smtClean="0"/>
-              <a:t>24/11/2021</a:t>
+              <a:t>25/11/2021</a:t>
             </a:fld>
             <a:endParaRPr lang="pt-PT"/>
           </a:p>
@@ -7945,28 +7945,8 @@
               <a:rPr lang="pt-PT" sz="2200" dirty="0">
                 <a:latin typeface="+mj-lt"/>
               </a:rPr>
-              <a:t>10.000 chamadas por ano (</a:t>
-            </a:r>
-            <a:r>
-              <a:rPr lang="pt-BR" sz="2200" dirty="0">
-                <a:latin typeface="+mj-lt"/>
-              </a:rPr>
-              <a:t>2.5 a 5 horas p/dia para chamadas)</a:t>
-            </a:r>
-            <a:endParaRPr lang="pt-PT" sz="2200" dirty="0">
-              <a:latin typeface="+mj-lt"/>
-            </a:endParaRPr>
-          </a:p>
-          <a:p>
-            <a:pPr marL="0" indent="0">
-              <a:lnSpc>
-                <a:spcPct val="150000"/>
-              </a:lnSpc>
-              <a:buNone/>
-            </a:pPr>
-            <a:endParaRPr lang="pt-PT" sz="2200" dirty="0">
-              <a:latin typeface="+mj-lt"/>
-            </a:endParaRPr>
+              <a:t>10.000 chamadas por ano</a:t>
+            </a:r>
           </a:p>
         </p:txBody>
       </p:sp>
@@ -10983,7 +10963,7 @@
         </p:nvSpPr>
         <p:spPr>
           <a:xfrm>
-            <a:off x="872288" y="2340068"/>
+            <a:off x="872288" y="2327037"/>
             <a:ext cx="10168128" cy="3695020"/>
           </a:xfrm>
         </p:spPr>
@@ -10993,10 +10973,15 @@
           </a:bodyPr>
           <a:lstStyle/>
           <a:p>
-            <a:pPr>
+            <a:pPr marL="457200" indent="-457200">
               <a:lnSpc>
-                <a:spcPct val="150000"/>
+                <a:spcPct val="100000"/>
               </a:lnSpc>
+              <a:spcBef>
+                <a:spcPts val="1800"/>
+              </a:spcBef>
+              <a:buFont typeface="+mj-lt"/>
+              <a:buAutoNum type="arabicPeriod"/>
             </a:pPr>
             <a:r>
               <a:rPr lang="pt-PT" sz="2200" dirty="0">
@@ -11006,23 +10991,53 @@
             </a:r>
           </a:p>
           <a:p>
-            <a:pPr>
+            <a:pPr marL="457200" indent="-457200">
               <a:lnSpc>
-                <a:spcPct val="150000"/>
+                <a:spcPct val="100000"/>
               </a:lnSpc>
+              <a:spcBef>
+                <a:spcPts val="1800"/>
+              </a:spcBef>
+              <a:buFont typeface="+mj-lt"/>
+              <a:buAutoNum type="arabicPeriod"/>
             </a:pPr>
             <a:r>
               <a:rPr lang="pt-PT" sz="2200" dirty="0">
                 <a:latin typeface="+mj-lt"/>
               </a:rPr>
-              <a:t>Melhor gestão de recursos humanos / tempo de serviço</a:t>
-            </a:r>
-          </a:p>
-          <a:p>
-            <a:pPr>
+              <a:t>Melhor gestão de recursos humanos / tempo de serviço </a:t>
+            </a:r>
+          </a:p>
+          <a:p>
+            <a:pPr lvl="1">
               <a:lnSpc>
-                <a:spcPct val="150000"/>
+                <a:spcPct val="100000"/>
               </a:lnSpc>
+              <a:spcBef>
+                <a:spcPts val="1800"/>
+              </a:spcBef>
+            </a:pPr>
+            <a:r>
+              <a:rPr lang="pt-BR" sz="1800" b="0" i="0" dirty="0">
+                <a:effectLst/>
+                <a:latin typeface="+mj-lt"/>
+              </a:rPr>
+              <a:t>2.5 a 5 horas p/ dia para chamadas</a:t>
+            </a:r>
+            <a:endParaRPr lang="pt-PT" dirty="0">
+              <a:latin typeface="+mj-lt"/>
+            </a:endParaRPr>
+          </a:p>
+          <a:p>
+            <a:pPr marL="457200" indent="-457200">
+              <a:lnSpc>
+                <a:spcPct val="100000"/>
+              </a:lnSpc>
+              <a:spcBef>
+                <a:spcPts val="1800"/>
+              </a:spcBef>
+              <a:buFont typeface="+mj-lt"/>
+              <a:buAutoNum type="arabicPeriod"/>
             </a:pPr>
             <a:r>
               <a:rPr lang="pt-PT" sz="2200" dirty="0">
@@ -11032,10 +11047,31 @@
             </a:r>
           </a:p>
           <a:p>
-            <a:pPr>
+            <a:pPr lvl="1">
               <a:lnSpc>
-                <a:spcPct val="150000"/>
+                <a:spcPct val="100000"/>
               </a:lnSpc>
+              <a:spcBef>
+                <a:spcPts val="1800"/>
+              </a:spcBef>
+            </a:pPr>
+            <a:r>
+              <a:rPr lang="pt-PT" sz="1800" dirty="0">
+                <a:latin typeface="+mj-lt"/>
+              </a:rPr>
+              <a:t>1 hora p/ dia recuperada </a:t>
+            </a:r>
+          </a:p>
+          <a:p>
+            <a:pPr marL="457200" indent="-457200">
+              <a:lnSpc>
+                <a:spcPct val="100000"/>
+              </a:lnSpc>
+              <a:spcBef>
+                <a:spcPts val="1800"/>
+              </a:spcBef>
+              <a:buFont typeface="+mj-lt"/>
+              <a:buAutoNum type="arabicPeriod"/>
             </a:pPr>
             <a:r>
               <a:rPr lang="pt-PT" sz="2200" dirty="0">
@@ -11067,7 +11103,7 @@
         </p:nvSpPr>
         <p:spPr>
           <a:xfrm>
-            <a:off x="8540496" y="6356350"/>
+            <a:off x="8481265" y="6354478"/>
             <a:ext cx="2743200" cy="365125"/>
           </a:xfrm>
         </p:spPr>
@@ -11138,7 +11174,7 @@
         </p:blipFill>
         <p:spPr bwMode="auto">
           <a:xfrm flipH="1">
-            <a:off x="1686992" y="4953406"/>
+            <a:off x="4712878" y="4875248"/>
             <a:ext cx="1720144" cy="1700074"/>
           </a:xfrm>
           <a:prstGeom prst="rect">
@@ -11171,9 +11207,9 @@
           <p:nvPr/>
         </p:nvCxnSpPr>
         <p:spPr>
-          <a:xfrm>
-            <a:off x="3434295" y="5723237"/>
-            <a:ext cx="5483406" cy="0"/>
+          <a:xfrm flipV="1">
+            <a:off x="6464737" y="5689635"/>
+            <a:ext cx="2769513" cy="1"/>
           </a:xfrm>
           <a:prstGeom prst="line">
             <a:avLst/>
@@ -11226,7 +11262,7 @@
         </p:blipFill>
         <p:spPr bwMode="auto">
           <a:xfrm flipH="1">
-            <a:off x="8621978" y="4943430"/>
+            <a:off x="9215200" y="4913437"/>
             <a:ext cx="1806166" cy="1806166"/>
           </a:xfrm>
           <a:prstGeom prst="rect">
@@ -11273,7 +11309,7 @@
         </p:blipFill>
         <p:spPr bwMode="auto">
           <a:xfrm>
-            <a:off x="5640079" y="5477876"/>
+            <a:off x="7618433" y="5415449"/>
             <a:ext cx="411356" cy="411356"/>
           </a:xfrm>
           <a:prstGeom prst="rect">
@@ -11738,20 +11774,20 @@
               <a:rPr lang="pt-PT" sz="2200" dirty="0">
                 <a:latin typeface="+mj-lt"/>
               </a:rPr>
-              <a:t>Escassez de alternativas</a:t>
+              <a:t>400 USFs a nível nacional</a:t>
             </a:r>
           </a:p>
           <a:p>
             <a:pPr>
               <a:lnSpc>
-                <a:spcPct val="100000"/>
+                <a:spcPct val="150000"/>
               </a:lnSpc>
             </a:pPr>
             <a:r>
               <a:rPr lang="pt-PT" sz="2200" dirty="0">
                 <a:latin typeface="+mj-lt"/>
               </a:rPr>
-              <a:t>Produtos existentes insuficientes</a:t>
+              <a:t>Outros centros de saúde </a:t>
             </a:r>
           </a:p>
         </p:txBody>
@@ -12430,7 +12466,7 @@
         </p:blipFill>
         <p:spPr bwMode="auto">
           <a:xfrm>
-            <a:off x="1497651" y="4559293"/>
+            <a:off x="1548958" y="4559293"/>
             <a:ext cx="1546518" cy="1600200"/>
           </a:xfrm>
           <a:prstGeom prst="rect">

</xml_diff>

<commit_message>
visualizador de pdfs +  pptxs
</commit_message>
<xml_diff>
--- a/_apresentações/analise_mercado.pptx
+++ b/_apresentações/analise_mercado.pptx
@@ -207,7 +207,7 @@
           <a:p>
             <a:fld id="{A59CCC90-DD18-45CE-9930-85E2190B6EB3}" type="datetimeFigureOut">
               <a:rPr lang="en-US" smtClean="0"/>
-              <a:t>11/25/2021</a:t>
+              <a:t>11/24/2021</a:t>
             </a:fld>
             <a:endParaRPr lang="en-US"/>
           </a:p>
@@ -1734,7 +1734,7 @@
           <a:p>
             <a:fld id="{7B2BFB5F-8F55-4037-8342-DBA37736C541}" type="datetime1">
               <a:rPr lang="pt-PT" smtClean="0"/>
-              <a:t>25/11/2021</a:t>
+              <a:t>24/11/2021</a:t>
             </a:fld>
             <a:endParaRPr lang="pt-PT"/>
           </a:p>
@@ -1934,7 +1934,7 @@
           <a:p>
             <a:fld id="{E88DAECE-19DC-4716-ACB9-133D8C1710C0}" type="datetime1">
               <a:rPr lang="pt-PT" smtClean="0"/>
-              <a:t>25/11/2021</a:t>
+              <a:t>24/11/2021</a:t>
             </a:fld>
             <a:endParaRPr lang="pt-PT"/>
           </a:p>
@@ -2144,7 +2144,7 @@
           <a:p>
             <a:fld id="{3126B636-9E32-4AEF-8D3D-FD0DB4968D19}" type="datetime1">
               <a:rPr lang="pt-PT" smtClean="0"/>
-              <a:t>25/11/2021</a:t>
+              <a:t>24/11/2021</a:t>
             </a:fld>
             <a:endParaRPr lang="pt-PT"/>
           </a:p>
@@ -2344,7 +2344,7 @@
           <a:p>
             <a:fld id="{75607C13-EF84-4BAF-858E-455D02510A9F}" type="datetime1">
               <a:rPr lang="pt-PT" smtClean="0"/>
-              <a:t>25/11/2021</a:t>
+              <a:t>24/11/2021</a:t>
             </a:fld>
             <a:endParaRPr lang="pt-PT"/>
           </a:p>
@@ -2620,7 +2620,7 @@
           <a:p>
             <a:fld id="{64BB17DF-5174-484A-B8E1-9D6AC6AFE7FD}" type="datetime1">
               <a:rPr lang="pt-PT" smtClean="0"/>
-              <a:t>25/11/2021</a:t>
+              <a:t>24/11/2021</a:t>
             </a:fld>
             <a:endParaRPr lang="pt-PT"/>
           </a:p>
@@ -2888,7 +2888,7 @@
           <a:p>
             <a:fld id="{A3C6A7FE-3508-4D9A-AB3E-37A53B7E80D8}" type="datetime1">
               <a:rPr lang="pt-PT" smtClean="0"/>
-              <a:t>25/11/2021</a:t>
+              <a:t>24/11/2021</a:t>
             </a:fld>
             <a:endParaRPr lang="pt-PT"/>
           </a:p>
@@ -3303,7 +3303,7 @@
           <a:p>
             <a:fld id="{DBC3BE71-E2F4-452C-BC14-F604DBAB02CB}" type="datetime1">
               <a:rPr lang="pt-PT" smtClean="0"/>
-              <a:t>25/11/2021</a:t>
+              <a:t>24/11/2021</a:t>
             </a:fld>
             <a:endParaRPr lang="pt-PT"/>
           </a:p>
@@ -3445,7 +3445,7 @@
           <a:p>
             <a:fld id="{16EE7CF8-E2C9-4EDF-91BD-12C54B596268}" type="datetime1">
               <a:rPr lang="pt-PT" smtClean="0"/>
-              <a:t>25/11/2021</a:t>
+              <a:t>24/11/2021</a:t>
             </a:fld>
             <a:endParaRPr lang="pt-PT"/>
           </a:p>
@@ -3558,7 +3558,7 @@
           <a:p>
             <a:fld id="{EB86D543-6D53-48E0-9647-8C8473FC00EB}" type="datetime1">
               <a:rPr lang="pt-PT" smtClean="0"/>
-              <a:t>25/11/2021</a:t>
+              <a:t>24/11/2021</a:t>
             </a:fld>
             <a:endParaRPr lang="pt-PT"/>
           </a:p>
@@ -3871,7 +3871,7 @@
           <a:p>
             <a:fld id="{6F927EA4-49A0-48A7-8D38-A660BF8D0961}" type="datetime1">
               <a:rPr lang="pt-PT" smtClean="0"/>
-              <a:t>25/11/2021</a:t>
+              <a:t>24/11/2021</a:t>
             </a:fld>
             <a:endParaRPr lang="pt-PT"/>
           </a:p>
@@ -4160,7 +4160,7 @@
           <a:p>
             <a:fld id="{72897C4C-3520-41E5-9678-9D542B992DBE}" type="datetime1">
               <a:rPr lang="pt-PT" smtClean="0"/>
-              <a:t>25/11/2021</a:t>
+              <a:t>24/11/2021</a:t>
             </a:fld>
             <a:endParaRPr lang="pt-PT"/>
           </a:p>
@@ -4403,7 +4403,7 @@
           <a:p>
             <a:fld id="{33E924EB-683F-4E34-A5D7-D4EBDFBAB650}" type="datetime1">
               <a:rPr lang="pt-PT" smtClean="0"/>
-              <a:t>25/11/2021</a:t>
+              <a:t>24/11/2021</a:t>
             </a:fld>
             <a:endParaRPr lang="pt-PT"/>
           </a:p>
@@ -7945,8 +7945,28 @@
               <a:rPr lang="pt-PT" sz="2200" dirty="0">
                 <a:latin typeface="+mj-lt"/>
               </a:rPr>
-              <a:t>10.000 chamadas por ano</a:t>
-            </a:r>
+              <a:t>10.000 chamadas por ano (</a:t>
+            </a:r>
+            <a:r>
+              <a:rPr lang="pt-BR" sz="2200" dirty="0">
+                <a:latin typeface="+mj-lt"/>
+              </a:rPr>
+              <a:t>2.5 a 5 horas p/dia para chamadas)</a:t>
+            </a:r>
+            <a:endParaRPr lang="pt-PT" sz="2200" dirty="0">
+              <a:latin typeface="+mj-lt"/>
+            </a:endParaRPr>
+          </a:p>
+          <a:p>
+            <a:pPr marL="0" indent="0">
+              <a:lnSpc>
+                <a:spcPct val="150000"/>
+              </a:lnSpc>
+              <a:buNone/>
+            </a:pPr>
+            <a:endParaRPr lang="pt-PT" sz="2200" dirty="0">
+              <a:latin typeface="+mj-lt"/>
+            </a:endParaRPr>
           </a:p>
         </p:txBody>
       </p:sp>
@@ -10963,7 +10983,7 @@
         </p:nvSpPr>
         <p:spPr>
           <a:xfrm>
-            <a:off x="872288" y="2327037"/>
+            <a:off x="872288" y="2340068"/>
             <a:ext cx="10168128" cy="3695020"/>
           </a:xfrm>
         </p:spPr>
@@ -10973,15 +10993,10 @@
           </a:bodyPr>
           <a:lstStyle/>
           <a:p>
-            <a:pPr marL="457200" indent="-457200">
+            <a:pPr>
               <a:lnSpc>
-                <a:spcPct val="100000"/>
+                <a:spcPct val="150000"/>
               </a:lnSpc>
-              <a:spcBef>
-                <a:spcPts val="1800"/>
-              </a:spcBef>
-              <a:buFont typeface="+mj-lt"/>
-              <a:buAutoNum type="arabicPeriod"/>
             </a:pPr>
             <a:r>
               <a:rPr lang="pt-PT" sz="2200" dirty="0">
@@ -10991,53 +11006,23 @@
             </a:r>
           </a:p>
           <a:p>
-            <a:pPr marL="457200" indent="-457200">
+            <a:pPr>
               <a:lnSpc>
-                <a:spcPct val="100000"/>
+                <a:spcPct val="150000"/>
               </a:lnSpc>
-              <a:spcBef>
-                <a:spcPts val="1800"/>
-              </a:spcBef>
-              <a:buFont typeface="+mj-lt"/>
-              <a:buAutoNum type="arabicPeriod"/>
             </a:pPr>
             <a:r>
               <a:rPr lang="pt-PT" sz="2200" dirty="0">
                 <a:latin typeface="+mj-lt"/>
               </a:rPr>
-              <a:t>Melhor gestão de recursos humanos / tempo de serviço </a:t>
-            </a:r>
-          </a:p>
-          <a:p>
-            <a:pPr lvl="1">
+              <a:t>Melhor gestão de recursos humanos / tempo de serviço</a:t>
+            </a:r>
+          </a:p>
+          <a:p>
+            <a:pPr>
               <a:lnSpc>
-                <a:spcPct val="100000"/>
+                <a:spcPct val="150000"/>
               </a:lnSpc>
-              <a:spcBef>
-                <a:spcPts val="1800"/>
-              </a:spcBef>
-            </a:pPr>
-            <a:r>
-              <a:rPr lang="pt-BR" sz="1800" b="0" i="0" dirty="0">
-                <a:effectLst/>
-                <a:latin typeface="+mj-lt"/>
-              </a:rPr>
-              <a:t>2.5 a 5 horas p/ dia para chamadas</a:t>
-            </a:r>
-            <a:endParaRPr lang="pt-PT" dirty="0">
-              <a:latin typeface="+mj-lt"/>
-            </a:endParaRPr>
-          </a:p>
-          <a:p>
-            <a:pPr marL="457200" indent="-457200">
-              <a:lnSpc>
-                <a:spcPct val="100000"/>
-              </a:lnSpc>
-              <a:spcBef>
-                <a:spcPts val="1800"/>
-              </a:spcBef>
-              <a:buFont typeface="+mj-lt"/>
-              <a:buAutoNum type="arabicPeriod"/>
             </a:pPr>
             <a:r>
               <a:rPr lang="pt-PT" sz="2200" dirty="0">
@@ -11047,31 +11032,10 @@
             </a:r>
           </a:p>
           <a:p>
-            <a:pPr lvl="1">
+            <a:pPr>
               <a:lnSpc>
-                <a:spcPct val="100000"/>
+                <a:spcPct val="150000"/>
               </a:lnSpc>
-              <a:spcBef>
-                <a:spcPts val="1800"/>
-              </a:spcBef>
-            </a:pPr>
-            <a:r>
-              <a:rPr lang="pt-PT" sz="1800" dirty="0">
-                <a:latin typeface="+mj-lt"/>
-              </a:rPr>
-              <a:t>1 hora p/ dia recuperada </a:t>
-            </a:r>
-          </a:p>
-          <a:p>
-            <a:pPr marL="457200" indent="-457200">
-              <a:lnSpc>
-                <a:spcPct val="100000"/>
-              </a:lnSpc>
-              <a:spcBef>
-                <a:spcPts val="1800"/>
-              </a:spcBef>
-              <a:buFont typeface="+mj-lt"/>
-              <a:buAutoNum type="arabicPeriod"/>
             </a:pPr>
             <a:r>
               <a:rPr lang="pt-PT" sz="2200" dirty="0">
@@ -11103,7 +11067,7 @@
         </p:nvSpPr>
         <p:spPr>
           <a:xfrm>
-            <a:off x="8481265" y="6354478"/>
+            <a:off x="8540496" y="6356350"/>
             <a:ext cx="2743200" cy="365125"/>
           </a:xfrm>
         </p:spPr>
@@ -11174,7 +11138,7 @@
         </p:blipFill>
         <p:spPr bwMode="auto">
           <a:xfrm flipH="1">
-            <a:off x="4712878" y="4875248"/>
+            <a:off x="1686992" y="4953406"/>
             <a:ext cx="1720144" cy="1700074"/>
           </a:xfrm>
           <a:prstGeom prst="rect">
@@ -11207,9 +11171,9 @@
           <p:nvPr/>
         </p:nvCxnSpPr>
         <p:spPr>
-          <a:xfrm flipV="1">
-            <a:off x="6464737" y="5689635"/>
-            <a:ext cx="2769513" cy="1"/>
+          <a:xfrm>
+            <a:off x="3434295" y="5723237"/>
+            <a:ext cx="5483406" cy="0"/>
           </a:xfrm>
           <a:prstGeom prst="line">
             <a:avLst/>
@@ -11262,7 +11226,7 @@
         </p:blipFill>
         <p:spPr bwMode="auto">
           <a:xfrm flipH="1">
-            <a:off x="9215200" y="4913437"/>
+            <a:off x="8621978" y="4943430"/>
             <a:ext cx="1806166" cy="1806166"/>
           </a:xfrm>
           <a:prstGeom prst="rect">
@@ -11309,7 +11273,7 @@
         </p:blipFill>
         <p:spPr bwMode="auto">
           <a:xfrm>
-            <a:off x="7618433" y="5415449"/>
+            <a:off x="5640079" y="5477876"/>
             <a:ext cx="411356" cy="411356"/>
           </a:xfrm>
           <a:prstGeom prst="rect">
@@ -11774,20 +11738,20 @@
               <a:rPr lang="pt-PT" sz="2200" dirty="0">
                 <a:latin typeface="+mj-lt"/>
               </a:rPr>
-              <a:t>400 USFs a nível nacional</a:t>
+              <a:t>Escassez de alternativas</a:t>
             </a:r>
           </a:p>
           <a:p>
             <a:pPr>
               <a:lnSpc>
-                <a:spcPct val="150000"/>
+                <a:spcPct val="100000"/>
               </a:lnSpc>
             </a:pPr>
             <a:r>
               <a:rPr lang="pt-PT" sz="2200" dirty="0">
                 <a:latin typeface="+mj-lt"/>
               </a:rPr>
-              <a:t>Outros centros de saúde </a:t>
+              <a:t>Produtos existentes insuficientes</a:t>
             </a:r>
           </a:p>
         </p:txBody>
@@ -12466,7 +12430,7 @@
         </p:blipFill>
         <p:spPr bwMode="auto">
           <a:xfrm>
-            <a:off x="1548958" y="4559293"/>
+            <a:off x="1497651" y="4559293"/>
             <a:ext cx="1546518" cy="1600200"/>
           </a:xfrm>
           <a:prstGeom prst="rect">

</xml_diff>